<commit_message>
changed features.png - added Teams in notification part added teams_plugin.md, made changes in se_flow_and_feature.pptx
</commit_message>
<xml_diff>
--- a/docs/se_diagrams/spark_expectations_flow_and_feature.pptx
+++ b/docs/se_diagrams/spark_expectations_flow_and_feature.pptx
@@ -271,7 +271,7 @@
           <a:p>
             <a:fld id="{61E6E3D5-B9D0-40A0-81B4-3FFEAC5ABAFD}" type="datetimeFigureOut">
               <a:rPr lang="en-US" smtClean="0"/>
-              <a:t>8/3/23</a:t>
+              <a:t>11/21/2023</a:t>
             </a:fld>
             <a:endParaRPr lang="en-US"/>
           </a:p>
@@ -469,7 +469,7 @@
           <a:p>
             <a:fld id="{61E6E3D5-B9D0-40A0-81B4-3FFEAC5ABAFD}" type="datetimeFigureOut">
               <a:rPr lang="en-US" smtClean="0"/>
-              <a:t>8/3/23</a:t>
+              <a:t>11/21/2023</a:t>
             </a:fld>
             <a:endParaRPr lang="en-US"/>
           </a:p>
@@ -677,7 +677,7 @@
           <a:p>
             <a:fld id="{61E6E3D5-B9D0-40A0-81B4-3FFEAC5ABAFD}" type="datetimeFigureOut">
               <a:rPr lang="en-US" smtClean="0"/>
-              <a:t>8/3/23</a:t>
+              <a:t>11/21/2023</a:t>
             </a:fld>
             <a:endParaRPr lang="en-US"/>
           </a:p>
@@ -875,7 +875,7 @@
           <a:p>
             <a:fld id="{61E6E3D5-B9D0-40A0-81B4-3FFEAC5ABAFD}" type="datetimeFigureOut">
               <a:rPr lang="en-US" smtClean="0"/>
-              <a:t>8/3/23</a:t>
+              <a:t>11/21/2023</a:t>
             </a:fld>
             <a:endParaRPr lang="en-US"/>
           </a:p>
@@ -1150,7 +1150,7 @@
           <a:p>
             <a:fld id="{61E6E3D5-B9D0-40A0-81B4-3FFEAC5ABAFD}" type="datetimeFigureOut">
               <a:rPr lang="en-US" smtClean="0"/>
-              <a:t>8/3/23</a:t>
+              <a:t>11/21/2023</a:t>
             </a:fld>
             <a:endParaRPr lang="en-US"/>
           </a:p>
@@ -1415,7 +1415,7 @@
           <a:p>
             <a:fld id="{61E6E3D5-B9D0-40A0-81B4-3FFEAC5ABAFD}" type="datetimeFigureOut">
               <a:rPr lang="en-US" smtClean="0"/>
-              <a:t>8/3/23</a:t>
+              <a:t>11/21/2023</a:t>
             </a:fld>
             <a:endParaRPr lang="en-US"/>
           </a:p>
@@ -1827,7 +1827,7 @@
           <a:p>
             <a:fld id="{61E6E3D5-B9D0-40A0-81B4-3FFEAC5ABAFD}" type="datetimeFigureOut">
               <a:rPr lang="en-US" smtClean="0"/>
-              <a:t>8/3/23</a:t>
+              <a:t>11/21/2023</a:t>
             </a:fld>
             <a:endParaRPr lang="en-US"/>
           </a:p>
@@ -1968,7 +1968,7 @@
           <a:p>
             <a:fld id="{61E6E3D5-B9D0-40A0-81B4-3FFEAC5ABAFD}" type="datetimeFigureOut">
               <a:rPr lang="en-US" smtClean="0"/>
-              <a:t>8/3/23</a:t>
+              <a:t>11/21/2023</a:t>
             </a:fld>
             <a:endParaRPr lang="en-US"/>
           </a:p>
@@ -2081,7 +2081,7 @@
           <a:p>
             <a:fld id="{61E6E3D5-B9D0-40A0-81B4-3FFEAC5ABAFD}" type="datetimeFigureOut">
               <a:rPr lang="en-US" smtClean="0"/>
-              <a:t>8/3/23</a:t>
+              <a:t>11/21/2023</a:t>
             </a:fld>
             <a:endParaRPr lang="en-US"/>
           </a:p>
@@ -2392,7 +2392,7 @@
           <a:p>
             <a:fld id="{61E6E3D5-B9D0-40A0-81B4-3FFEAC5ABAFD}" type="datetimeFigureOut">
               <a:rPr lang="en-US" smtClean="0"/>
-              <a:t>8/3/23</a:t>
+              <a:t>11/21/2023</a:t>
             </a:fld>
             <a:endParaRPr lang="en-US"/>
           </a:p>
@@ -2680,7 +2680,7 @@
           <a:p>
             <a:fld id="{61E6E3D5-B9D0-40A0-81B4-3FFEAC5ABAFD}" type="datetimeFigureOut">
               <a:rPr lang="en-US" smtClean="0"/>
-              <a:t>8/3/23</a:t>
+              <a:t>11/21/2023</a:t>
             </a:fld>
             <a:endParaRPr lang="en-US"/>
           </a:p>
@@ -2921,7 +2921,7 @@
           <a:p>
             <a:fld id="{61E6E3D5-B9D0-40A0-81B4-3FFEAC5ABAFD}" type="datetimeFigureOut">
               <a:rPr lang="en-US" smtClean="0"/>
-              <a:t>8/3/23</a:t>
+              <a:t>11/21/2023</a:t>
             </a:fld>
             <a:endParaRPr lang="en-US"/>
           </a:p>
@@ -5163,7 +5163,15 @@
           <a:p>
             <a:r>
               <a:rPr lang="en-IN" dirty="0"/>
-              <a:t>Slack and Email Notifications</a:t>
+              <a:t>Slack</a:t>
+            </a:r>
+            <a:r>
+              <a:rPr lang="en-IN"/>
+              <a:t>, Teams </a:t>
+            </a:r>
+            <a:r>
+              <a:rPr lang="en-IN" dirty="0"/>
+              <a:t>and Email Notifications</a:t>
             </a:r>
           </a:p>
         </p:txBody>

</xml_diff>

<commit_message>
Add teams notification feature - Enabling push notifications to teams channel (#57)
* Added the user_config variables for the Teams notification

* Added teams.py, made changes for get and set methods for teams variables and also added exception for teams

* changed features.png - added Teams in notification part
added teams_plugin.md, made changes in se_flow_and_feature.pptx

* Added test documents in the subsequent folder and ran successfully

* Added pytest for the changes done

---------

Co-authored-by: BharatSahitya <129821952+BharatSahitya@users.noreply.github.com>
</commit_message>
<xml_diff>
--- a/docs/se_diagrams/spark_expectations_flow_and_feature.pptx
+++ b/docs/se_diagrams/spark_expectations_flow_and_feature.pptx
@@ -271,7 +271,7 @@
           <a:p>
             <a:fld id="{61E6E3D5-B9D0-40A0-81B4-3FFEAC5ABAFD}" type="datetimeFigureOut">
               <a:rPr lang="en-US" smtClean="0"/>
-              <a:t>8/3/23</a:t>
+              <a:t>11/21/2023</a:t>
             </a:fld>
             <a:endParaRPr lang="en-US"/>
           </a:p>
@@ -469,7 +469,7 @@
           <a:p>
             <a:fld id="{61E6E3D5-B9D0-40A0-81B4-3FFEAC5ABAFD}" type="datetimeFigureOut">
               <a:rPr lang="en-US" smtClean="0"/>
-              <a:t>8/3/23</a:t>
+              <a:t>11/21/2023</a:t>
             </a:fld>
             <a:endParaRPr lang="en-US"/>
           </a:p>
@@ -677,7 +677,7 @@
           <a:p>
             <a:fld id="{61E6E3D5-B9D0-40A0-81B4-3FFEAC5ABAFD}" type="datetimeFigureOut">
               <a:rPr lang="en-US" smtClean="0"/>
-              <a:t>8/3/23</a:t>
+              <a:t>11/21/2023</a:t>
             </a:fld>
             <a:endParaRPr lang="en-US"/>
           </a:p>
@@ -875,7 +875,7 @@
           <a:p>
             <a:fld id="{61E6E3D5-B9D0-40A0-81B4-3FFEAC5ABAFD}" type="datetimeFigureOut">
               <a:rPr lang="en-US" smtClean="0"/>
-              <a:t>8/3/23</a:t>
+              <a:t>11/21/2023</a:t>
             </a:fld>
             <a:endParaRPr lang="en-US"/>
           </a:p>
@@ -1150,7 +1150,7 @@
           <a:p>
             <a:fld id="{61E6E3D5-B9D0-40A0-81B4-3FFEAC5ABAFD}" type="datetimeFigureOut">
               <a:rPr lang="en-US" smtClean="0"/>
-              <a:t>8/3/23</a:t>
+              <a:t>11/21/2023</a:t>
             </a:fld>
             <a:endParaRPr lang="en-US"/>
           </a:p>
@@ -1415,7 +1415,7 @@
           <a:p>
             <a:fld id="{61E6E3D5-B9D0-40A0-81B4-3FFEAC5ABAFD}" type="datetimeFigureOut">
               <a:rPr lang="en-US" smtClean="0"/>
-              <a:t>8/3/23</a:t>
+              <a:t>11/21/2023</a:t>
             </a:fld>
             <a:endParaRPr lang="en-US"/>
           </a:p>
@@ -1827,7 +1827,7 @@
           <a:p>
             <a:fld id="{61E6E3D5-B9D0-40A0-81B4-3FFEAC5ABAFD}" type="datetimeFigureOut">
               <a:rPr lang="en-US" smtClean="0"/>
-              <a:t>8/3/23</a:t>
+              <a:t>11/21/2023</a:t>
             </a:fld>
             <a:endParaRPr lang="en-US"/>
           </a:p>
@@ -1968,7 +1968,7 @@
           <a:p>
             <a:fld id="{61E6E3D5-B9D0-40A0-81B4-3FFEAC5ABAFD}" type="datetimeFigureOut">
               <a:rPr lang="en-US" smtClean="0"/>
-              <a:t>8/3/23</a:t>
+              <a:t>11/21/2023</a:t>
             </a:fld>
             <a:endParaRPr lang="en-US"/>
           </a:p>
@@ -2081,7 +2081,7 @@
           <a:p>
             <a:fld id="{61E6E3D5-B9D0-40A0-81B4-3FFEAC5ABAFD}" type="datetimeFigureOut">
               <a:rPr lang="en-US" smtClean="0"/>
-              <a:t>8/3/23</a:t>
+              <a:t>11/21/2023</a:t>
             </a:fld>
             <a:endParaRPr lang="en-US"/>
           </a:p>
@@ -2392,7 +2392,7 @@
           <a:p>
             <a:fld id="{61E6E3D5-B9D0-40A0-81B4-3FFEAC5ABAFD}" type="datetimeFigureOut">
               <a:rPr lang="en-US" smtClean="0"/>
-              <a:t>8/3/23</a:t>
+              <a:t>11/21/2023</a:t>
             </a:fld>
             <a:endParaRPr lang="en-US"/>
           </a:p>
@@ -2680,7 +2680,7 @@
           <a:p>
             <a:fld id="{61E6E3D5-B9D0-40A0-81B4-3FFEAC5ABAFD}" type="datetimeFigureOut">
               <a:rPr lang="en-US" smtClean="0"/>
-              <a:t>8/3/23</a:t>
+              <a:t>11/21/2023</a:t>
             </a:fld>
             <a:endParaRPr lang="en-US"/>
           </a:p>
@@ -2921,7 +2921,7 @@
           <a:p>
             <a:fld id="{61E6E3D5-B9D0-40A0-81B4-3FFEAC5ABAFD}" type="datetimeFigureOut">
               <a:rPr lang="en-US" smtClean="0"/>
-              <a:t>8/3/23</a:t>
+              <a:t>11/21/2023</a:t>
             </a:fld>
             <a:endParaRPr lang="en-US"/>
           </a:p>
@@ -5163,7 +5163,15 @@
           <a:p>
             <a:r>
               <a:rPr lang="en-IN" dirty="0"/>
-              <a:t>Slack and Email Notifications</a:t>
+              <a:t>Slack</a:t>
+            </a:r>
+            <a:r>
+              <a:rPr lang="en-IN"/>
+              <a:t>, Teams </a:t>
+            </a:r>
+            <a:r>
+              <a:rPr lang="en-IN" dirty="0"/>
+              <a:t>and Email Notifications</a:t>
             </a:r>
           </a:p>
         </p:txBody>

</xml_diff>

<commit_message>
Integrating the notifications to Zoom Webhook (#83)
* Update CONTRIBUTORS.md

* Added zoom notification
</commit_message>
<xml_diff>
--- a/docs/se_diagrams/spark_expectations_flow_and_feature.pptx
+++ b/docs/se_diagrams/spark_expectations_flow_and_feature.pptx
@@ -271,7 +271,7 @@
           <a:p>
             <a:fld id="{61E6E3D5-B9D0-40A0-81B4-3FFEAC5ABAFD}" type="datetimeFigureOut">
               <a:rPr lang="en-US" smtClean="0"/>
-              <a:t>11/21/2023</a:t>
+              <a:t>5/30/2024</a:t>
             </a:fld>
             <a:endParaRPr lang="en-US"/>
           </a:p>
@@ -469,7 +469,7 @@
           <a:p>
             <a:fld id="{61E6E3D5-B9D0-40A0-81B4-3FFEAC5ABAFD}" type="datetimeFigureOut">
               <a:rPr lang="en-US" smtClean="0"/>
-              <a:t>11/21/2023</a:t>
+              <a:t>5/30/2024</a:t>
             </a:fld>
             <a:endParaRPr lang="en-US"/>
           </a:p>
@@ -677,7 +677,7 @@
           <a:p>
             <a:fld id="{61E6E3D5-B9D0-40A0-81B4-3FFEAC5ABAFD}" type="datetimeFigureOut">
               <a:rPr lang="en-US" smtClean="0"/>
-              <a:t>11/21/2023</a:t>
+              <a:t>5/30/2024</a:t>
             </a:fld>
             <a:endParaRPr lang="en-US"/>
           </a:p>
@@ -875,7 +875,7 @@
           <a:p>
             <a:fld id="{61E6E3D5-B9D0-40A0-81B4-3FFEAC5ABAFD}" type="datetimeFigureOut">
               <a:rPr lang="en-US" smtClean="0"/>
-              <a:t>11/21/2023</a:t>
+              <a:t>5/30/2024</a:t>
             </a:fld>
             <a:endParaRPr lang="en-US"/>
           </a:p>
@@ -1150,7 +1150,7 @@
           <a:p>
             <a:fld id="{61E6E3D5-B9D0-40A0-81B4-3FFEAC5ABAFD}" type="datetimeFigureOut">
               <a:rPr lang="en-US" smtClean="0"/>
-              <a:t>11/21/2023</a:t>
+              <a:t>5/30/2024</a:t>
             </a:fld>
             <a:endParaRPr lang="en-US"/>
           </a:p>
@@ -1415,7 +1415,7 @@
           <a:p>
             <a:fld id="{61E6E3D5-B9D0-40A0-81B4-3FFEAC5ABAFD}" type="datetimeFigureOut">
               <a:rPr lang="en-US" smtClean="0"/>
-              <a:t>11/21/2023</a:t>
+              <a:t>5/30/2024</a:t>
             </a:fld>
             <a:endParaRPr lang="en-US"/>
           </a:p>
@@ -1827,7 +1827,7 @@
           <a:p>
             <a:fld id="{61E6E3D5-B9D0-40A0-81B4-3FFEAC5ABAFD}" type="datetimeFigureOut">
               <a:rPr lang="en-US" smtClean="0"/>
-              <a:t>11/21/2023</a:t>
+              <a:t>5/30/2024</a:t>
             </a:fld>
             <a:endParaRPr lang="en-US"/>
           </a:p>
@@ -1968,7 +1968,7 @@
           <a:p>
             <a:fld id="{61E6E3D5-B9D0-40A0-81B4-3FFEAC5ABAFD}" type="datetimeFigureOut">
               <a:rPr lang="en-US" smtClean="0"/>
-              <a:t>11/21/2023</a:t>
+              <a:t>5/30/2024</a:t>
             </a:fld>
             <a:endParaRPr lang="en-US"/>
           </a:p>
@@ -2081,7 +2081,7 @@
           <a:p>
             <a:fld id="{61E6E3D5-B9D0-40A0-81B4-3FFEAC5ABAFD}" type="datetimeFigureOut">
               <a:rPr lang="en-US" smtClean="0"/>
-              <a:t>11/21/2023</a:t>
+              <a:t>5/30/2024</a:t>
             </a:fld>
             <a:endParaRPr lang="en-US"/>
           </a:p>
@@ -2392,7 +2392,7 @@
           <a:p>
             <a:fld id="{61E6E3D5-B9D0-40A0-81B4-3FFEAC5ABAFD}" type="datetimeFigureOut">
               <a:rPr lang="en-US" smtClean="0"/>
-              <a:t>11/21/2023</a:t>
+              <a:t>5/30/2024</a:t>
             </a:fld>
             <a:endParaRPr lang="en-US"/>
           </a:p>
@@ -2680,7 +2680,7 @@
           <a:p>
             <a:fld id="{61E6E3D5-B9D0-40A0-81B4-3FFEAC5ABAFD}" type="datetimeFigureOut">
               <a:rPr lang="en-US" smtClean="0"/>
-              <a:t>11/21/2023</a:t>
+              <a:t>5/30/2024</a:t>
             </a:fld>
             <a:endParaRPr lang="en-US"/>
           </a:p>
@@ -2921,7 +2921,7 @@
           <a:p>
             <a:fld id="{61E6E3D5-B9D0-40A0-81B4-3FFEAC5ABAFD}" type="datetimeFigureOut">
               <a:rPr lang="en-US" smtClean="0"/>
-              <a:t>11/21/2023</a:t>
+              <a:t>5/30/2024</a:t>
             </a:fld>
             <a:endParaRPr lang="en-US"/>
           </a:p>
@@ -5163,15 +5163,7 @@
           <a:p>
             <a:r>
               <a:rPr lang="en-IN" dirty="0"/>
-              <a:t>Slack</a:t>
-            </a:r>
-            <a:r>
-              <a:rPr lang="en-IN"/>
-              <a:t>, Teams </a:t>
-            </a:r>
-            <a:r>
-              <a:rPr lang="en-IN" dirty="0"/>
-              <a:t>and Email Notifications</a:t>
+              <a:t>Slack, Teams, Zoom and Email Notifications</a:t>
             </a:r>
           </a:p>
         </p:txBody>

</xml_diff>